<commit_message>
Création de groupe de la page d'accueil
</commit_message>
<xml_diff>
--- a/Process/Process Brief.pptx
+++ b/Process/Process Brief.pptx
@@ -200,7 +200,7 @@
           <a:p>
             <a:fld id="{B7F13A85-740D-F445-A2BA-A0B2B5F0DD37}" type="datetimeFigureOut">
               <a:rPr lang="fr-FR" smtClean="0"/>
-              <a:t>23/02/2021</a:t>
+              <a:t>24/02/2021</a:t>
             </a:fld>
             <a:endParaRPr lang="fr-FR"/>
           </a:p>
@@ -692,7 +692,7 @@
             <a:fld id="{5586B75A-687E-405C-8A0B-8D00578BA2C3}" type="datetimeFigureOut">
               <a:rPr lang="en-US" dirty="0"/>
               <a:pPr/>
-              <a:t>2/23/21</a:t>
+              <a:t>2/24/21</a:t>
             </a:fld>
             <a:endParaRPr lang="en-US" dirty="0"/>
           </a:p>
@@ -859,7 +859,7 @@
             <a:fld id="{5586B75A-687E-405C-8A0B-8D00578BA2C3}" type="datetimeFigureOut">
               <a:rPr lang="en-US" dirty="0"/>
               <a:pPr/>
-              <a:t>2/23/21</a:t>
+              <a:t>2/24/21</a:t>
             </a:fld>
             <a:endParaRPr lang="en-US" dirty="0"/>
           </a:p>
@@ -1036,7 +1036,7 @@
             <a:fld id="{5586B75A-687E-405C-8A0B-8D00578BA2C3}" type="datetimeFigureOut">
               <a:rPr lang="en-US" dirty="0"/>
               <a:pPr/>
-              <a:t>2/23/21</a:t>
+              <a:t>2/24/21</a:t>
             </a:fld>
             <a:endParaRPr lang="en-US" dirty="0"/>
           </a:p>
@@ -1203,7 +1203,7 @@
             <a:fld id="{5586B75A-687E-405C-8A0B-8D00578BA2C3}" type="datetimeFigureOut">
               <a:rPr lang="en-US" dirty="0"/>
               <a:pPr/>
-              <a:t>2/23/21</a:t>
+              <a:t>2/24/21</a:t>
             </a:fld>
             <a:endParaRPr lang="en-US" dirty="0"/>
           </a:p>
@@ -1458,7 +1458,7 @@
             <a:fld id="{5586B75A-687E-405C-8A0B-8D00578BA2C3}" type="datetimeFigureOut">
               <a:rPr lang="en-US" dirty="0"/>
               <a:pPr/>
-              <a:t>2/23/21</a:t>
+              <a:t>2/24/21</a:t>
             </a:fld>
             <a:endParaRPr lang="en-US" dirty="0"/>
           </a:p>
@@ -1743,7 +1743,7 @@
             <a:fld id="{5586B75A-687E-405C-8A0B-8D00578BA2C3}" type="datetimeFigureOut">
               <a:rPr lang="en-US" dirty="0"/>
               <a:pPr/>
-              <a:t>2/23/21</a:t>
+              <a:t>2/24/21</a:t>
             </a:fld>
             <a:endParaRPr lang="en-US" dirty="0"/>
           </a:p>
@@ -2182,7 +2182,7 @@
             <a:fld id="{5586B75A-687E-405C-8A0B-8D00578BA2C3}" type="datetimeFigureOut">
               <a:rPr lang="en-US" dirty="0"/>
               <a:pPr/>
-              <a:t>2/23/21</a:t>
+              <a:t>2/24/21</a:t>
             </a:fld>
             <a:endParaRPr lang="en-US" dirty="0"/>
           </a:p>
@@ -2297,7 +2297,7 @@
             <a:fld id="{5586B75A-687E-405C-8A0B-8D00578BA2C3}" type="datetimeFigureOut">
               <a:rPr lang="en-US" dirty="0"/>
               <a:pPr/>
-              <a:t>2/23/21</a:t>
+              <a:t>2/24/21</a:t>
             </a:fld>
             <a:endParaRPr lang="en-US" dirty="0"/>
           </a:p>
@@ -2389,7 +2389,7 @@
             <a:fld id="{5586B75A-687E-405C-8A0B-8D00578BA2C3}" type="datetimeFigureOut">
               <a:rPr lang="en-US" dirty="0"/>
               <a:pPr/>
-              <a:t>2/23/21</a:t>
+              <a:t>2/24/21</a:t>
             </a:fld>
             <a:endParaRPr lang="en-US" dirty="0"/>
           </a:p>
@@ -2674,7 +2674,7 @@
             <a:fld id="{5586B75A-687E-405C-8A0B-8D00578BA2C3}" type="datetimeFigureOut">
               <a:rPr lang="en-US" dirty="0"/>
               <a:pPr/>
-              <a:t>2/23/21</a:t>
+              <a:t>2/24/21</a:t>
             </a:fld>
             <a:endParaRPr lang="en-US" dirty="0"/>
           </a:p>
@@ -2944,7 +2944,7 @@
             <a:fld id="{5586B75A-687E-405C-8A0B-8D00578BA2C3}" type="datetimeFigureOut">
               <a:rPr lang="en-US" dirty="0"/>
               <a:pPr/>
-              <a:t>2/23/21</a:t>
+              <a:t>2/24/21</a:t>
             </a:fld>
             <a:endParaRPr lang="en-US" dirty="0"/>
           </a:p>
@@ -3238,7 +3238,7 @@
             <a:fld id="{5586B75A-687E-405C-8A0B-8D00578BA2C3}" type="datetimeFigureOut">
               <a:rPr lang="en-US" dirty="0"/>
               <a:pPr/>
-              <a:t>2/23/21</a:t>
+              <a:t>2/24/21</a:t>
             </a:fld>
             <a:endParaRPr lang="en-US" dirty="0"/>
           </a:p>
@@ -4619,7 +4619,7 @@
             </p:nvSpPr>
             <p:spPr>
               <a:xfrm>
-                <a:off x="5025680" y="1991923"/>
+                <a:off x="5065265" y="1944731"/>
                 <a:ext cx="1561171" cy="888344"/>
               </a:xfrm>
               <a:prstGeom prst="rect">
@@ -4887,7 +4887,7 @@
             </p:nvSpPr>
             <p:spPr>
               <a:xfrm>
-                <a:off x="1393902" y="2318147"/>
+                <a:off x="1387482" y="2196022"/>
                 <a:ext cx="1561171" cy="1200329"/>
               </a:xfrm>
               <a:prstGeom prst="rect">
@@ -5548,12 +5548,20 @@
             <a:p>
               <a:pPr algn="ctr"/>
               <a:r>
+                <a:rPr lang="fr-FR" sz="2800" b="1">
+                  <a:solidFill>
+                    <a:schemeClr val="bg1"/>
+                  </a:solidFill>
+                </a:rPr>
+                <a:t>3. </a:t>
+              </a:r>
+              <a:r>
                 <a:rPr lang="fr-FR" sz="2800" b="1" dirty="0">
                   <a:solidFill>
                     <a:schemeClr val="bg1"/>
                   </a:solidFill>
                 </a:rPr>
-                <a:t>2. Répartition </a:t>
+                <a:t>Répartition </a:t>
               </a:r>
             </a:p>
           </p:txBody>
@@ -6436,7 +6444,7 @@
         </p:nvSpPr>
         <p:spPr>
           <a:xfrm>
-            <a:off x="739947" y="1872666"/>
+            <a:off x="739947" y="1886156"/>
             <a:ext cx="10278720" cy="923330"/>
           </a:xfrm>
           <a:prstGeom prst="rect">

</xml_diff>